<commit_message>
update estimateRoute seq diagram
</commit_message>
<xml_diff>
--- a/docs/diagrams/ShowLocationSequenceDiagram.pptx
+++ b/docs/diagrams/ShowLocationSequenceDiagram.pptx
@@ -208,7 +208,7 @@
           <a:p>
             <a:fld id="{F5CC4B3F-88C1-4FFA-B1B6-F41C21DC6924}" type="datetimeFigureOut">
               <a:rPr lang="en-US" smtClean="0"/>
-              <a:t>3/20/18</a:t>
+              <a:t>3/27/18</a:t>
             </a:fld>
             <a:endParaRPr lang="en-US"/>
           </a:p>
@@ -475,6 +475,90 @@
 </p:notesMaster>
 </file>
 
+<file path=ppt/notesSlides/notesSlide1.xml><?xml version="1.0" encoding="utf-8"?>
+<p:notes xmlns:a="http://schemas.openxmlformats.org/drawingml/2006/main" xmlns:r="http://schemas.openxmlformats.org/officeDocument/2006/relationships" xmlns:p="http://schemas.openxmlformats.org/presentationml/2006/main">
+  <p:cSld>
+    <p:spTree>
+      <p:nvGrpSpPr>
+        <p:cNvPr id="1" name=""/>
+        <p:cNvGrpSpPr/>
+        <p:nvPr/>
+      </p:nvGrpSpPr>
+      <p:grpSpPr>
+        <a:xfrm>
+          <a:off x="0" y="0"/>
+          <a:ext cx="0" cy="0"/>
+          <a:chOff x="0" y="0"/>
+          <a:chExt cx="0" cy="0"/>
+        </a:xfrm>
+      </p:grpSpPr>
+      <p:sp>
+        <p:nvSpPr>
+          <p:cNvPr id="2" name="Slide Image Placeholder 1"/>
+          <p:cNvSpPr>
+            <a:spLocks noGrp="1" noRot="1" noChangeAspect="1"/>
+          </p:cNvSpPr>
+          <p:nvPr>
+            <p:ph type="sldImg"/>
+          </p:nvPr>
+        </p:nvSpPr>
+        <p:spPr/>
+      </p:sp>
+      <p:sp>
+        <p:nvSpPr>
+          <p:cNvPr id="3" name="Notes Placeholder 2"/>
+          <p:cNvSpPr>
+            <a:spLocks noGrp="1"/>
+          </p:cNvSpPr>
+          <p:nvPr>
+            <p:ph type="body" idx="1"/>
+          </p:nvPr>
+        </p:nvSpPr>
+        <p:spPr/>
+        <p:txBody>
+          <a:bodyPr/>
+          <a:lstStyle/>
+          <a:p>
+            <a:endParaRPr lang="en-US" dirty="0"/>
+          </a:p>
+        </p:txBody>
+      </p:sp>
+      <p:sp>
+        <p:nvSpPr>
+          <p:cNvPr id="4" name="Slide Number Placeholder 3"/>
+          <p:cNvSpPr>
+            <a:spLocks noGrp="1"/>
+          </p:cNvSpPr>
+          <p:nvPr>
+            <p:ph type="sldNum" sz="quarter" idx="10"/>
+          </p:nvPr>
+        </p:nvSpPr>
+        <p:spPr/>
+        <p:txBody>
+          <a:bodyPr/>
+          <a:lstStyle/>
+          <a:p>
+            <a:fld id="{5A7AB025-77E3-4BD1-A2FD-B3183DBA47A3}" type="slidenum">
+              <a:rPr lang="en-US" smtClean="0"/>
+              <a:t>1</a:t>
+            </a:fld>
+            <a:endParaRPr lang="en-US"/>
+          </a:p>
+        </p:txBody>
+      </p:sp>
+    </p:spTree>
+    <p:extLst>
+      <p:ext uri="{BB962C8B-B14F-4D97-AF65-F5344CB8AC3E}">
+        <p14:creationId xmlns:p14="http://schemas.microsoft.com/office/powerpoint/2010/main" val="2053256359"/>
+      </p:ext>
+    </p:extLst>
+  </p:cSld>
+  <p:clrMapOvr>
+    <a:masterClrMapping/>
+  </p:clrMapOvr>
+</p:notes>
+</file>
+
 <file path=ppt/slideLayouts/slideLayout1.xml><?xml version="1.0" encoding="utf-8"?>
 <p:sldLayout xmlns:a="http://schemas.openxmlformats.org/drawingml/2006/main" xmlns:r="http://schemas.openxmlformats.org/officeDocument/2006/relationships" xmlns:p="http://schemas.openxmlformats.org/presentationml/2006/main" type="title" preserve="1">
   <p:cSld name="Title Slide">
@@ -654,7 +738,7 @@
           <a:p>
             <a:fld id="{78C97017-6FC3-485B-9764-EAC9E56C1D49}" type="datetimeFigureOut">
               <a:rPr lang="en-US" smtClean="0"/>
-              <a:t>3/20/18</a:t>
+              <a:t>3/27/18</a:t>
             </a:fld>
             <a:endParaRPr lang="en-US"/>
           </a:p>
@@ -822,7 +906,7 @@
           <a:p>
             <a:fld id="{78C97017-6FC3-485B-9764-EAC9E56C1D49}" type="datetimeFigureOut">
               <a:rPr lang="en-US" smtClean="0"/>
-              <a:t>3/20/18</a:t>
+              <a:t>3/27/18</a:t>
             </a:fld>
             <a:endParaRPr lang="en-US"/>
           </a:p>
@@ -1000,7 +1084,7 @@
           <a:p>
             <a:fld id="{78C97017-6FC3-485B-9764-EAC9E56C1D49}" type="datetimeFigureOut">
               <a:rPr lang="en-US" smtClean="0"/>
-              <a:t>3/20/18</a:t>
+              <a:t>3/27/18</a:t>
             </a:fld>
             <a:endParaRPr lang="en-US"/>
           </a:p>
@@ -1168,7 +1252,7 @@
           <a:p>
             <a:fld id="{78C97017-6FC3-485B-9764-EAC9E56C1D49}" type="datetimeFigureOut">
               <a:rPr lang="en-US" smtClean="0"/>
-              <a:t>3/20/18</a:t>
+              <a:t>3/27/18</a:t>
             </a:fld>
             <a:endParaRPr lang="en-US"/>
           </a:p>
@@ -1413,7 +1497,7 @@
           <a:p>
             <a:fld id="{78C97017-6FC3-485B-9764-EAC9E56C1D49}" type="datetimeFigureOut">
               <a:rPr lang="en-US" smtClean="0"/>
-              <a:t>3/20/18</a:t>
+              <a:t>3/27/18</a:t>
             </a:fld>
             <a:endParaRPr lang="en-US"/>
           </a:p>
@@ -1698,7 +1782,7 @@
           <a:p>
             <a:fld id="{78C97017-6FC3-485B-9764-EAC9E56C1D49}" type="datetimeFigureOut">
               <a:rPr lang="en-US" smtClean="0"/>
-              <a:t>3/20/18</a:t>
+              <a:t>3/27/18</a:t>
             </a:fld>
             <a:endParaRPr lang="en-US"/>
           </a:p>
@@ -2117,7 +2201,7 @@
           <a:p>
             <a:fld id="{78C97017-6FC3-485B-9764-EAC9E56C1D49}" type="datetimeFigureOut">
               <a:rPr lang="en-US" smtClean="0"/>
-              <a:t>3/20/18</a:t>
+              <a:t>3/27/18</a:t>
             </a:fld>
             <a:endParaRPr lang="en-US"/>
           </a:p>
@@ -2234,7 +2318,7 @@
           <a:p>
             <a:fld id="{78C97017-6FC3-485B-9764-EAC9E56C1D49}" type="datetimeFigureOut">
               <a:rPr lang="en-US" smtClean="0"/>
-              <a:t>3/20/18</a:t>
+              <a:t>3/27/18</a:t>
             </a:fld>
             <a:endParaRPr lang="en-US"/>
           </a:p>
@@ -2329,7 +2413,7 @@
           <a:p>
             <a:fld id="{78C97017-6FC3-485B-9764-EAC9E56C1D49}" type="datetimeFigureOut">
               <a:rPr lang="en-US" smtClean="0"/>
-              <a:t>3/20/18</a:t>
+              <a:t>3/27/18</a:t>
             </a:fld>
             <a:endParaRPr lang="en-US"/>
           </a:p>
@@ -2604,7 +2688,7 @@
           <a:p>
             <a:fld id="{78C97017-6FC3-485B-9764-EAC9E56C1D49}" type="datetimeFigureOut">
               <a:rPr lang="en-US" smtClean="0"/>
-              <a:t>3/20/18</a:t>
+              <a:t>3/27/18</a:t>
             </a:fld>
             <a:endParaRPr lang="en-US"/>
           </a:p>
@@ -2856,7 +2940,7 @@
           <a:p>
             <a:fld id="{78C97017-6FC3-485B-9764-EAC9E56C1D49}" type="datetimeFigureOut">
               <a:rPr lang="en-US" smtClean="0"/>
-              <a:t>3/20/18</a:t>
+              <a:t>3/27/18</a:t>
             </a:fld>
             <a:endParaRPr lang="en-US"/>
           </a:p>
@@ -3067,7 +3151,7 @@
           <a:p>
             <a:fld id="{78C97017-6FC3-485B-9764-EAC9E56C1D49}" type="datetimeFigureOut">
               <a:rPr lang="en-US" smtClean="0"/>
-              <a:t>3/20/18</a:t>
+              <a:t>3/27/18</a:t>
             </a:fld>
             <a:endParaRPr lang="en-US"/>
           </a:p>
@@ -3450,8 +3534,8 @@
         </p:nvSpPr>
         <p:spPr>
           <a:xfrm>
-            <a:off x="685799" y="1981200"/>
-            <a:ext cx="8152309" cy="4572000"/>
+            <a:off x="533401" y="1981200"/>
+            <a:ext cx="8304708" cy="4572000"/>
           </a:xfrm>
           <a:prstGeom prst="roundRect">
             <a:avLst>
@@ -3511,7 +3595,7 @@
         </p:nvSpPr>
         <p:spPr>
           <a:xfrm>
-            <a:off x="845045" y="2296546"/>
+            <a:off x="711926" y="2324828"/>
             <a:ext cx="1455629" cy="346760"/>
           </a:xfrm>
           <a:prstGeom prst="rect">
@@ -3578,7 +3662,7 @@
         </p:nvCxnSpPr>
         <p:spPr>
           <a:xfrm>
-            <a:off x="1572859" y="2660217"/>
+            <a:off x="1295766" y="2688466"/>
             <a:ext cx="0" cy="2597583"/>
           </a:xfrm>
           <a:prstGeom prst="line">
@@ -3615,7 +3699,7 @@
         </p:nvSpPr>
         <p:spPr>
           <a:xfrm>
-            <a:off x="1500851" y="3010911"/>
+            <a:off x="1216437" y="3010911"/>
             <a:ext cx="156190" cy="3373158"/>
           </a:xfrm>
           <a:prstGeom prst="rect">
@@ -3981,7 +4065,7 @@
         </p:nvCxnSpPr>
         <p:spPr>
           <a:xfrm>
-            <a:off x="381000" y="3014599"/>
+            <a:off x="125873" y="3010911"/>
             <a:ext cx="1119851" cy="0"/>
           </a:xfrm>
           <a:prstGeom prst="straightConnector1">
@@ -4018,9 +4102,9 @@
           <p:nvPr/>
         </p:nvCxnSpPr>
         <p:spPr>
-          <a:xfrm>
-            <a:off x="1653251" y="3122099"/>
-            <a:ext cx="1346459" cy="16747"/>
+          <a:xfrm flipV="1">
+            <a:off x="1355751" y="3138846"/>
+            <a:ext cx="1643959" cy="3503"/>
           </a:xfrm>
           <a:prstGeom prst="straightConnector1">
             <a:avLst/>
@@ -4055,7 +4139,7 @@
         </p:nvSpPr>
         <p:spPr>
           <a:xfrm>
-            <a:off x="-443438" y="2771593"/>
+            <a:off x="-674262" y="2757413"/>
             <a:ext cx="2010593" cy="215444"/>
           </a:xfrm>
           <a:prstGeom prst="rect">
@@ -4225,9 +4309,9 @@
           <p:nvPr/>
         </p:nvCxnSpPr>
         <p:spPr>
-          <a:xfrm>
-            <a:off x="1670186" y="4248609"/>
-            <a:ext cx="1416446" cy="2947"/>
+          <a:xfrm flipV="1">
+            <a:off x="1375096" y="4251556"/>
+            <a:ext cx="1711536" cy="7750"/>
           </a:xfrm>
           <a:prstGeom prst="straightConnector1">
             <a:avLst/>
@@ -4264,7 +4348,7 @@
         </p:nvCxnSpPr>
         <p:spPr>
           <a:xfrm>
-            <a:off x="304800" y="6384069"/>
+            <a:off x="30623" y="6384069"/>
             <a:ext cx="1196051" cy="0"/>
           </a:xfrm>
           <a:prstGeom prst="straightConnector1">
@@ -4362,13 +4446,15 @@
       <p:cxnSp>
         <p:nvCxnSpPr>
           <p:cNvPr id="64" name="Straight Arrow Connector 63"/>
-          <p:cNvCxnSpPr/>
+          <p:cNvCxnSpPr>
+            <a:cxnSpLocks/>
+          </p:cNvCxnSpPr>
           <p:nvPr/>
         </p:nvCxnSpPr>
         <p:spPr>
-          <a:xfrm>
-            <a:off x="1653251" y="4495317"/>
-            <a:ext cx="5043123" cy="0"/>
+          <a:xfrm flipV="1">
+            <a:off x="1372627" y="4495317"/>
+            <a:ext cx="5323747" cy="19921"/>
           </a:xfrm>
           <a:prstGeom prst="straightConnector1">
             <a:avLst/>
@@ -4624,13 +4710,15 @@
       <p:cxnSp>
         <p:nvCxnSpPr>
           <p:cNvPr id="77" name="Straight Arrow Connector 76"/>
-          <p:cNvCxnSpPr/>
+          <p:cNvCxnSpPr>
+            <a:cxnSpLocks/>
+          </p:cNvCxnSpPr>
           <p:nvPr/>
         </p:nvCxnSpPr>
         <p:spPr>
           <a:xfrm>
-            <a:off x="1653251" y="6127552"/>
-            <a:ext cx="5052349" cy="0"/>
+            <a:off x="1372627" y="6127552"/>
+            <a:ext cx="5332973" cy="0"/>
           </a:xfrm>
           <a:prstGeom prst="straightConnector1">
             <a:avLst/>
@@ -4815,7 +4903,7 @@
         </p:nvSpPr>
         <p:spPr>
           <a:xfrm>
-            <a:off x="570983" y="6170105"/>
+            <a:off x="183546" y="5971157"/>
             <a:ext cx="762000" cy="215444"/>
           </a:xfrm>
           <a:prstGeom prst="rect">
@@ -5485,7 +5573,7 @@
         </p:nvSpPr>
         <p:spPr>
           <a:xfrm>
-            <a:off x="1150979" y="2766258"/>
+            <a:off x="1040342" y="2854074"/>
             <a:ext cx="2010593" cy="215444"/>
           </a:xfrm>
           <a:prstGeom prst="rect">

</xml_diff>

<commit_message>
add manual testing for er sl and va
</commit_message>
<xml_diff>
--- a/docs/diagrams/ShowLocationSequenceDiagram.pptx
+++ b/docs/diagrams/ShowLocationSequenceDiagram.pptx
@@ -208,7 +208,7 @@
           <a:p>
             <a:fld id="{F5CC4B3F-88C1-4FFA-B1B6-F41C21DC6924}" type="datetimeFigureOut">
               <a:rPr lang="en-US" smtClean="0"/>
-              <a:t>4/9/18</a:t>
+              <a:t>4/13/2018</a:t>
             </a:fld>
             <a:endParaRPr lang="en-US"/>
           </a:p>
@@ -738,7 +738,7 @@
           <a:p>
             <a:fld id="{78C97017-6FC3-485B-9764-EAC9E56C1D49}" type="datetimeFigureOut">
               <a:rPr lang="en-US" smtClean="0"/>
-              <a:t>4/9/18</a:t>
+              <a:t>4/13/2018</a:t>
             </a:fld>
             <a:endParaRPr lang="en-US"/>
           </a:p>
@@ -906,7 +906,7 @@
           <a:p>
             <a:fld id="{78C97017-6FC3-485B-9764-EAC9E56C1D49}" type="datetimeFigureOut">
               <a:rPr lang="en-US" smtClean="0"/>
-              <a:t>4/9/18</a:t>
+              <a:t>4/13/2018</a:t>
             </a:fld>
             <a:endParaRPr lang="en-US"/>
           </a:p>
@@ -1084,7 +1084,7 @@
           <a:p>
             <a:fld id="{78C97017-6FC3-485B-9764-EAC9E56C1D49}" type="datetimeFigureOut">
               <a:rPr lang="en-US" smtClean="0"/>
-              <a:t>4/9/18</a:t>
+              <a:t>4/13/2018</a:t>
             </a:fld>
             <a:endParaRPr lang="en-US"/>
           </a:p>
@@ -1252,7 +1252,7 @@
           <a:p>
             <a:fld id="{78C97017-6FC3-485B-9764-EAC9E56C1D49}" type="datetimeFigureOut">
               <a:rPr lang="en-US" smtClean="0"/>
-              <a:t>4/9/18</a:t>
+              <a:t>4/13/2018</a:t>
             </a:fld>
             <a:endParaRPr lang="en-US"/>
           </a:p>
@@ -1497,7 +1497,7 @@
           <a:p>
             <a:fld id="{78C97017-6FC3-485B-9764-EAC9E56C1D49}" type="datetimeFigureOut">
               <a:rPr lang="en-US" smtClean="0"/>
-              <a:t>4/9/18</a:t>
+              <a:t>4/13/2018</a:t>
             </a:fld>
             <a:endParaRPr lang="en-US"/>
           </a:p>
@@ -1782,7 +1782,7 @@
           <a:p>
             <a:fld id="{78C97017-6FC3-485B-9764-EAC9E56C1D49}" type="datetimeFigureOut">
               <a:rPr lang="en-US" smtClean="0"/>
-              <a:t>4/9/18</a:t>
+              <a:t>4/13/2018</a:t>
             </a:fld>
             <a:endParaRPr lang="en-US"/>
           </a:p>
@@ -2201,7 +2201,7 @@
           <a:p>
             <a:fld id="{78C97017-6FC3-485B-9764-EAC9E56C1D49}" type="datetimeFigureOut">
               <a:rPr lang="en-US" smtClean="0"/>
-              <a:t>4/9/18</a:t>
+              <a:t>4/13/2018</a:t>
             </a:fld>
             <a:endParaRPr lang="en-US"/>
           </a:p>
@@ -2318,7 +2318,7 @@
           <a:p>
             <a:fld id="{78C97017-6FC3-485B-9764-EAC9E56C1D49}" type="datetimeFigureOut">
               <a:rPr lang="en-US" smtClean="0"/>
-              <a:t>4/9/18</a:t>
+              <a:t>4/13/2018</a:t>
             </a:fld>
             <a:endParaRPr lang="en-US"/>
           </a:p>
@@ -2413,7 +2413,7 @@
           <a:p>
             <a:fld id="{78C97017-6FC3-485B-9764-EAC9E56C1D49}" type="datetimeFigureOut">
               <a:rPr lang="en-US" smtClean="0"/>
-              <a:t>4/9/18</a:t>
+              <a:t>4/13/2018</a:t>
             </a:fld>
             <a:endParaRPr lang="en-US"/>
           </a:p>
@@ -2688,7 +2688,7 @@
           <a:p>
             <a:fld id="{78C97017-6FC3-485B-9764-EAC9E56C1D49}" type="datetimeFigureOut">
               <a:rPr lang="en-US" smtClean="0"/>
-              <a:t>4/9/18</a:t>
+              <a:t>4/13/2018</a:t>
             </a:fld>
             <a:endParaRPr lang="en-US"/>
           </a:p>
@@ -2940,7 +2940,7 @@
           <a:p>
             <a:fld id="{78C97017-6FC3-485B-9764-EAC9E56C1D49}" type="datetimeFigureOut">
               <a:rPr lang="en-US" smtClean="0"/>
-              <a:t>4/9/18</a:t>
+              <a:t>4/13/2018</a:t>
             </a:fld>
             <a:endParaRPr lang="en-US"/>
           </a:p>
@@ -3151,7 +3151,7 @@
           <a:p>
             <a:fld id="{78C97017-6FC3-485B-9764-EAC9E56C1D49}" type="datetimeFigureOut">
               <a:rPr lang="en-US" smtClean="0"/>
-              <a:t>4/9/18</a:t>
+              <a:t>4/13/2018</a:t>
             </a:fld>
             <a:endParaRPr lang="en-US"/>
           </a:p>
@@ -4386,8 +4386,8 @@
         </p:nvSpPr>
         <p:spPr>
           <a:xfrm>
-            <a:off x="9776569" y="2173684"/>
-            <a:ext cx="1272431" cy="419577"/>
+            <a:off x="9918169" y="2194566"/>
+            <a:ext cx="1130831" cy="398695"/>
           </a:xfrm>
           <a:prstGeom prst="rect">
             <a:avLst/>
@@ -5380,7 +5380,7 @@
         </p:nvSpPr>
         <p:spPr>
           <a:xfrm>
-            <a:off x="4758536" y="4270249"/>
+            <a:off x="4742759" y="4120751"/>
             <a:ext cx="258404" cy="261610"/>
           </a:xfrm>
           <a:prstGeom prst="rect">
@@ -6453,8 +6453,8 @@
         </p:nvSpPr>
         <p:spPr>
           <a:xfrm>
-            <a:off x="10340309" y="3838871"/>
-            <a:ext cx="205844" cy="132215"/>
+            <a:off x="10340309" y="3875926"/>
+            <a:ext cx="205842" cy="95160"/>
           </a:xfrm>
           <a:prstGeom prst="rect">
             <a:avLst/>
@@ -6508,7 +6508,7 @@
         </p:nvCxnSpPr>
         <p:spPr>
           <a:xfrm>
-            <a:off x="6877204" y="3838871"/>
+            <a:off x="6877204" y="3886200"/>
             <a:ext cx="3473594" cy="0"/>
           </a:xfrm>
           <a:prstGeom prst="straightConnector1">
@@ -6596,7 +6596,7 @@
         </p:nvSpPr>
         <p:spPr>
           <a:xfrm>
-            <a:off x="5772913" y="3644988"/>
+            <a:off x="5700567" y="3677471"/>
             <a:ext cx="2854157" cy="215444"/>
           </a:xfrm>
           <a:prstGeom prst="rect">
@@ -6628,6 +6628,45 @@
             <a:r>
               <a:rPr lang="en-US" dirty="0"/>
               <a:t>()</a:t>
+            </a:r>
+          </a:p>
+        </p:txBody>
+      </p:sp>
+      <p:sp>
+        <p:nvSpPr>
+          <p:cNvPr id="87" name="TextBox 86">
+            <a:extLst>
+              <a:ext uri="{FF2B5EF4-FFF2-40B4-BE49-F238E27FC236}">
+                <a16:creationId xmlns:a16="http://schemas.microsoft.com/office/drawing/2014/main" id="{DDACE042-ECCA-4040-9060-B7BA25A8599F}"/>
+              </a:ext>
+            </a:extLst>
+          </p:cNvPr>
+          <p:cNvSpPr txBox="1"/>
+          <p:nvPr/>
+        </p:nvSpPr>
+        <p:spPr>
+          <a:xfrm>
+            <a:off x="6639878" y="6261575"/>
+            <a:ext cx="258404" cy="261610"/>
+          </a:xfrm>
+          <a:prstGeom prst="rect">
+            <a:avLst/>
+          </a:prstGeom>
+          <a:noFill/>
+        </p:spPr>
+        <p:txBody>
+          <a:bodyPr wrap="none" rtlCol="0">
+            <a:spAutoFit/>
+          </a:bodyPr>
+          <a:lstStyle/>
+          <a:p>
+            <a:r>
+              <a:rPr lang="en-SG" sz="1100" dirty="0">
+                <a:solidFill>
+                  <a:srgbClr val="002060"/>
+                </a:solidFill>
+              </a:rPr>
+              <a:t>X</a:t>
             </a:r>
           </a:p>
         </p:txBody>

</xml_diff>